<commit_message>
Updated Database & UML
</commit_message>
<xml_diff>
--- a/Presentation/SAB_Group_Presentation.pptx
+++ b/Presentation/SAB_Group_Presentation.pptx
@@ -5,7 +5,7 @@
     <p:sldMasterId id="2147483648" r:id="rId1"/>
   </p:sldMasterIdLst>
   <p:notesMasterIdLst>
-    <p:notesMasterId r:id="rId12"/>
+    <p:notesMasterId r:id="rId14"/>
   </p:notesMasterIdLst>
   <p:sldIdLst>
     <p:sldId id="256" r:id="rId2"/>
@@ -15,9 +15,11 @@
     <p:sldId id="266" r:id="rId6"/>
     <p:sldId id="267" r:id="rId7"/>
     <p:sldId id="272" r:id="rId8"/>
-    <p:sldId id="273" r:id="rId9"/>
-    <p:sldId id="275" r:id="rId10"/>
-    <p:sldId id="276" r:id="rId11"/>
+    <p:sldId id="277" r:id="rId9"/>
+    <p:sldId id="278" r:id="rId10"/>
+    <p:sldId id="273" r:id="rId11"/>
+    <p:sldId id="275" r:id="rId12"/>
+    <p:sldId id="276" r:id="rId13"/>
   </p:sldIdLst>
   <p:sldSz cx="12192000" cy="6858000"/>
   <p:notesSz cx="6858000" cy="9144000"/>
@@ -206,7 +208,7 @@
           <a:p>
             <a:fld id="{CECFCCBB-1A37-1943-A54C-DC15C493B50A}" type="datetimeFigureOut">
               <a:rPr lang="en-US" smtClean="0"/>
-              <a:t>4/20/17</a:t>
+              <a:t>4/20/2017</a:t>
             </a:fld>
             <a:endParaRPr lang="en-US"/>
           </a:p>
@@ -270,38 +272,37 @@
           <a:p>
             <a:pPr lvl="0"/>
             <a:r>
-              <a:rPr lang="en-US" smtClean="0"/>
+              <a:rPr lang="en-US"/>
               <a:t>Click to edit Master text styles</a:t>
             </a:r>
           </a:p>
           <a:p>
             <a:pPr lvl="1"/>
             <a:r>
-              <a:rPr lang="en-US" smtClean="0"/>
+              <a:rPr lang="en-US"/>
               <a:t>Second level</a:t>
             </a:r>
           </a:p>
           <a:p>
             <a:pPr lvl="2"/>
             <a:r>
-              <a:rPr lang="en-US" smtClean="0"/>
+              <a:rPr lang="en-US"/>
               <a:t>Third level</a:t>
             </a:r>
           </a:p>
           <a:p>
             <a:pPr lvl="3"/>
             <a:r>
-              <a:rPr lang="en-US" smtClean="0"/>
+              <a:rPr lang="en-US"/>
               <a:t>Fourth level</a:t>
             </a:r>
           </a:p>
           <a:p>
             <a:pPr lvl="4"/>
             <a:r>
-              <a:rPr lang="en-US" smtClean="0"/>
+              <a:rPr lang="en-US"/>
               <a:t>Fifth level</a:t>
             </a:r>
-            <a:endParaRPr lang="en-US"/>
           </a:p>
         </p:txBody>
       </p:sp>
@@ -657,7 +658,7 @@
           </a:lstStyle>
           <a:p>
             <a:r>
-              <a:rPr lang="en-US" smtClean="0"/>
+              <a:rPr lang="en-US"/>
               <a:t>Click to edit Master title style</a:t>
             </a:r>
             <a:endParaRPr lang="en-US" dirty="0"/>
@@ -724,7 +725,7 @@
           </a:lstStyle>
           <a:p>
             <a:r>
-              <a:rPr lang="en-US" smtClean="0"/>
+              <a:rPr lang="en-US"/>
               <a:t>Click to edit Master subtitle style</a:t>
             </a:r>
             <a:endParaRPr lang="en-US" dirty="0"/>
@@ -748,7 +749,7 @@
           <a:p>
             <a:fld id="{78ABE3C1-DBE1-495D-B57B-2849774B866A}" type="datetimeFigureOut">
               <a:rPr lang="en-US" dirty="0"/>
-              <a:t>4/20/17</a:t>
+              <a:t>4/20/2017</a:t>
             </a:fld>
             <a:endParaRPr lang="en-US" dirty="0"/>
           </a:p>
@@ -992,7 +993,7 @@
           </a:lstStyle>
           <a:p>
             <a:r>
-              <a:rPr lang="en-US" smtClean="0"/>
+              <a:rPr lang="en-US"/>
               <a:t>Click to edit Master title style</a:t>
             </a:r>
             <a:endParaRPr lang="en-US" dirty="0"/>
@@ -1068,7 +1069,7 @@
           </a:lstStyle>
           <a:p>
             <a:r>
-              <a:rPr lang="en-US" smtClean="0"/>
+              <a:rPr lang="en-US"/>
               <a:t>Drag picture to placeholder or click icon to add</a:t>
             </a:r>
             <a:endParaRPr lang="en-US" dirty="0"/>
@@ -1134,7 +1135,7 @@
           <a:p>
             <a:pPr lvl="0"/>
             <a:r>
-              <a:rPr lang="en-US" smtClean="0"/>
+              <a:rPr lang="en-US"/>
               <a:t>Click to edit Master text styles</a:t>
             </a:r>
           </a:p>
@@ -1157,7 +1158,7 @@
           <a:p>
             <a:fld id="{446C117F-5CCF-4837-BE5F-2B92066CAFAF}" type="datetimeFigureOut">
               <a:rPr lang="en-US" dirty="0"/>
-              <a:t>4/20/17</a:t>
+              <a:t>4/20/2017</a:t>
             </a:fld>
             <a:endParaRPr lang="en-US" dirty="0"/>
           </a:p>
@@ -1399,7 +1400,7 @@
           </a:lstStyle>
           <a:p>
             <a:r>
-              <a:rPr lang="en-US" smtClean="0"/>
+              <a:rPr lang="en-US"/>
               <a:t>Click to edit Master title style</a:t>
             </a:r>
             <a:endParaRPr lang="en-US" dirty="0"/>
@@ -1465,7 +1466,7 @@
           <a:p>
             <a:pPr lvl="0"/>
             <a:r>
-              <a:rPr lang="en-US" smtClean="0"/>
+              <a:rPr lang="en-US"/>
               <a:t>Click to edit Master text styles</a:t>
             </a:r>
           </a:p>
@@ -1488,7 +1489,7 @@
           <a:p>
             <a:fld id="{84EB90BD-B6CE-46B7-997F-7313B992CCDC}" type="datetimeFigureOut">
               <a:rPr lang="en-US" dirty="0"/>
-              <a:t>4/20/17</a:t>
+              <a:t>4/20/2017</a:t>
             </a:fld>
             <a:endParaRPr lang="en-US" dirty="0"/>
           </a:p>
@@ -1730,7 +1731,7 @@
           </a:lstStyle>
           <a:p>
             <a:r>
-              <a:rPr lang="en-US" smtClean="0"/>
+              <a:rPr lang="en-US"/>
               <a:t>Click to edit Master title style</a:t>
             </a:r>
             <a:endParaRPr lang="en-US" dirty="0"/>
@@ -1798,7 +1799,7 @@
           <a:p>
             <a:pPr lvl="0"/>
             <a:r>
-              <a:rPr lang="en-US" smtClean="0"/>
+              <a:rPr lang="en-US"/>
               <a:t>Click to edit Master text styles</a:t>
             </a:r>
           </a:p>
@@ -1865,7 +1866,7 @@
           <a:p>
             <a:pPr lvl="0"/>
             <a:r>
-              <a:rPr lang="en-US" smtClean="0"/>
+              <a:rPr lang="en-US"/>
               <a:t>Click to edit Master text styles</a:t>
             </a:r>
           </a:p>
@@ -1888,7 +1889,7 @@
           <a:p>
             <a:fld id="{CDB9D11F-B188-461D-B23F-39381795C052}" type="datetimeFigureOut">
               <a:rPr lang="en-US" dirty="0"/>
-              <a:t>4/20/17</a:t>
+              <a:t>4/20/2017</a:t>
             </a:fld>
             <a:endParaRPr lang="en-US" dirty="0"/>
           </a:p>
@@ -2362,7 +2363,7 @@
           </a:lstStyle>
           <a:p>
             <a:r>
-              <a:rPr lang="en-US" smtClean="0"/>
+              <a:rPr lang="en-US"/>
               <a:t>Click to edit Master title style</a:t>
             </a:r>
             <a:endParaRPr lang="en-US" dirty="0"/>
@@ -2428,7 +2429,7 @@
           <a:p>
             <a:pPr lvl="0"/>
             <a:r>
-              <a:rPr lang="en-US" smtClean="0"/>
+              <a:rPr lang="en-US"/>
               <a:t>Click to edit Master text styles</a:t>
             </a:r>
           </a:p>
@@ -2451,7 +2452,7 @@
           <a:p>
             <a:fld id="{52E6D8D9-55A2-4063-B0F3-121F44549695}" type="datetimeFigureOut">
               <a:rPr lang="en-US" dirty="0"/>
-              <a:t>4/20/17</a:t>
+              <a:t>4/20/2017</a:t>
             </a:fld>
             <a:endParaRPr lang="en-US" dirty="0"/>
           </a:p>
@@ -2689,7 +2690,7 @@
           <a:lstStyle/>
           <a:p>
             <a:r>
-              <a:rPr lang="en-US" smtClean="0"/>
+              <a:rPr lang="en-US"/>
               <a:t>Click to edit Master title style</a:t>
             </a:r>
             <a:endParaRPr lang="en-US" dirty="0"/>
@@ -2761,7 +2762,7 @@
           <a:p>
             <a:pPr lvl="0"/>
             <a:r>
-              <a:rPr lang="en-US" smtClean="0"/>
+              <a:rPr lang="en-US"/>
               <a:t>Click to edit Master text styles</a:t>
             </a:r>
           </a:p>
@@ -2828,7 +2829,7 @@
           <a:p>
             <a:pPr lvl="0"/>
             <a:r>
-              <a:rPr lang="en-US" smtClean="0"/>
+              <a:rPr lang="en-US"/>
               <a:t>Click to edit Master text styles</a:t>
             </a:r>
           </a:p>
@@ -2899,7 +2900,7 @@
           <a:p>
             <a:pPr lvl="0"/>
             <a:r>
-              <a:rPr lang="en-US" smtClean="0"/>
+              <a:rPr lang="en-US"/>
               <a:t>Click to edit Master text styles</a:t>
             </a:r>
           </a:p>
@@ -2966,7 +2967,7 @@
           <a:p>
             <a:pPr lvl="0"/>
             <a:r>
-              <a:rPr lang="en-US" smtClean="0"/>
+              <a:rPr lang="en-US"/>
               <a:t>Click to edit Master text styles</a:t>
             </a:r>
           </a:p>
@@ -3037,7 +3038,7 @@
           <a:p>
             <a:pPr lvl="0"/>
             <a:r>
-              <a:rPr lang="en-US" smtClean="0"/>
+              <a:rPr lang="en-US"/>
               <a:t>Click to edit Master text styles</a:t>
             </a:r>
           </a:p>
@@ -3104,7 +3105,7 @@
           <a:p>
             <a:pPr lvl="0"/>
             <a:r>
-              <a:rPr lang="en-US" smtClean="0"/>
+              <a:rPr lang="en-US"/>
               <a:t>Click to edit Master text styles</a:t>
             </a:r>
           </a:p>
@@ -3127,7 +3128,7 @@
           <a:p>
             <a:fld id="{D4B24536-994D-4021-A283-9F449C0DB509}" type="datetimeFigureOut">
               <a:rPr lang="en-US" dirty="0"/>
-              <a:t>4/20/17</a:t>
+              <a:t>4/20/2017</a:t>
             </a:fld>
             <a:endParaRPr lang="en-US" dirty="0"/>
           </a:p>
@@ -3360,7 +3361,7 @@
           <a:lstStyle/>
           <a:p>
             <a:r>
-              <a:rPr lang="en-US" smtClean="0"/>
+              <a:rPr lang="en-US"/>
               <a:t>Click to edit Master title style</a:t>
             </a:r>
             <a:endParaRPr lang="en-US" dirty="0"/>
@@ -3432,7 +3433,7 @@
           <a:p>
             <a:pPr lvl="0"/>
             <a:r>
-              <a:rPr lang="en-US" smtClean="0"/>
+              <a:rPr lang="en-US"/>
               <a:t>Click to edit Master text styles</a:t>
             </a:r>
           </a:p>
@@ -3510,7 +3511,7 @@
           </a:lstStyle>
           <a:p>
             <a:r>
-              <a:rPr lang="en-US" smtClean="0"/>
+              <a:rPr lang="en-US"/>
               <a:t>Drag picture to placeholder or click icon to add</a:t>
             </a:r>
             <a:endParaRPr lang="en-US" dirty="0"/>
@@ -3578,7 +3579,7 @@
           <a:p>
             <a:pPr lvl="0"/>
             <a:r>
-              <a:rPr lang="en-US" smtClean="0"/>
+              <a:rPr lang="en-US"/>
               <a:t>Click to edit Master text styles</a:t>
             </a:r>
           </a:p>
@@ -3649,7 +3650,7 @@
           <a:p>
             <a:pPr lvl="0"/>
             <a:r>
-              <a:rPr lang="en-US" smtClean="0"/>
+              <a:rPr lang="en-US"/>
               <a:t>Click to edit Master text styles</a:t>
             </a:r>
           </a:p>
@@ -3727,7 +3728,7 @@
           </a:lstStyle>
           <a:p>
             <a:r>
-              <a:rPr lang="en-US" smtClean="0"/>
+              <a:rPr lang="en-US"/>
               <a:t>Drag picture to placeholder or click icon to add</a:t>
             </a:r>
             <a:endParaRPr lang="en-US" dirty="0"/>
@@ -3795,7 +3796,7 @@
           <a:p>
             <a:pPr lvl="0"/>
             <a:r>
-              <a:rPr lang="en-US" smtClean="0"/>
+              <a:rPr lang="en-US"/>
               <a:t>Click to edit Master text styles</a:t>
             </a:r>
           </a:p>
@@ -3866,7 +3867,7 @@
           <a:p>
             <a:pPr lvl="0"/>
             <a:r>
-              <a:rPr lang="en-US" smtClean="0"/>
+              <a:rPr lang="en-US"/>
               <a:t>Click to edit Master text styles</a:t>
             </a:r>
           </a:p>
@@ -3944,7 +3945,7 @@
           </a:lstStyle>
           <a:p>
             <a:r>
-              <a:rPr lang="en-US" smtClean="0"/>
+              <a:rPr lang="en-US"/>
               <a:t>Drag picture to placeholder or click icon to add</a:t>
             </a:r>
             <a:endParaRPr lang="en-US" dirty="0"/>
@@ -4012,7 +4013,7 @@
           <a:p>
             <a:pPr lvl="0"/>
             <a:r>
-              <a:rPr lang="en-US" smtClean="0"/>
+              <a:rPr lang="en-US"/>
               <a:t>Click to edit Master text styles</a:t>
             </a:r>
           </a:p>
@@ -4035,7 +4036,7 @@
           <a:p>
             <a:fld id="{3CBBBB78-C96F-47B7-AB17-D852CA960AC9}" type="datetimeFigureOut">
               <a:rPr lang="en-US" dirty="0"/>
-              <a:t>4/20/17</a:t>
+              <a:t>4/20/2017</a:t>
             </a:fld>
             <a:endParaRPr lang="en-US" dirty="0"/>
           </a:p>
@@ -4267,7 +4268,7 @@
           </a:lstStyle>
           <a:p>
             <a:r>
-              <a:rPr lang="en-US" smtClean="0"/>
+              <a:rPr lang="en-US"/>
               <a:t>Click to edit Master title style</a:t>
             </a:r>
             <a:endParaRPr lang="en-US" dirty="0"/>
@@ -4291,35 +4292,35 @@
           <a:p>
             <a:pPr lvl="0"/>
             <a:r>
-              <a:rPr lang="en-US" smtClean="0"/>
+              <a:rPr lang="en-US"/>
               <a:t>Click to edit Master text styles</a:t>
             </a:r>
           </a:p>
           <a:p>
             <a:pPr lvl="1"/>
             <a:r>
-              <a:rPr lang="en-US" smtClean="0"/>
+              <a:rPr lang="en-US"/>
               <a:t>Second level</a:t>
             </a:r>
           </a:p>
           <a:p>
             <a:pPr lvl="2"/>
             <a:r>
-              <a:rPr lang="en-US" smtClean="0"/>
+              <a:rPr lang="en-US"/>
               <a:t>Third level</a:t>
             </a:r>
           </a:p>
           <a:p>
             <a:pPr lvl="3"/>
             <a:r>
-              <a:rPr lang="en-US" smtClean="0"/>
+              <a:rPr lang="en-US"/>
               <a:t>Fourth level</a:t>
             </a:r>
           </a:p>
           <a:p>
             <a:pPr lvl="4"/>
             <a:r>
-              <a:rPr lang="en-US" smtClean="0"/>
+              <a:rPr lang="en-US"/>
               <a:t>Fifth level</a:t>
             </a:r>
             <a:endParaRPr lang="en-US" dirty="0"/>
@@ -4343,7 +4344,7 @@
           <a:p>
             <a:fld id="{1FA3F48C-C7C6-4055-9F49-3777875E72AE}" type="datetimeFigureOut">
               <a:rPr lang="en-US" dirty="0"/>
-              <a:t>4/20/17</a:t>
+              <a:t>4/20/2017</a:t>
             </a:fld>
             <a:endParaRPr lang="en-US" dirty="0"/>
           </a:p>
@@ -4516,7 +4517,7 @@
           <a:lstStyle/>
           <a:p>
             <a:r>
-              <a:rPr lang="en-US" smtClean="0"/>
+              <a:rPr lang="en-US"/>
               <a:t>Click to edit Master title style</a:t>
             </a:r>
             <a:endParaRPr lang="en-US" dirty="0"/>
@@ -4545,35 +4546,35 @@
           <a:p>
             <a:pPr lvl="0"/>
             <a:r>
-              <a:rPr lang="en-US" smtClean="0"/>
+              <a:rPr lang="en-US"/>
               <a:t>Click to edit Master text styles</a:t>
             </a:r>
           </a:p>
           <a:p>
             <a:pPr lvl="1"/>
             <a:r>
-              <a:rPr lang="en-US" smtClean="0"/>
+              <a:rPr lang="en-US"/>
               <a:t>Second level</a:t>
             </a:r>
           </a:p>
           <a:p>
             <a:pPr lvl="2"/>
             <a:r>
-              <a:rPr lang="en-US" smtClean="0"/>
+              <a:rPr lang="en-US"/>
               <a:t>Third level</a:t>
             </a:r>
           </a:p>
           <a:p>
             <a:pPr lvl="3"/>
             <a:r>
-              <a:rPr lang="en-US" smtClean="0"/>
+              <a:rPr lang="en-US"/>
               <a:t>Fourth level</a:t>
             </a:r>
           </a:p>
           <a:p>
             <a:pPr lvl="4"/>
             <a:r>
-              <a:rPr lang="en-US" smtClean="0"/>
+              <a:rPr lang="en-US"/>
               <a:t>Fifth level</a:t>
             </a:r>
             <a:endParaRPr lang="en-US" dirty="0"/>
@@ -4602,7 +4603,7 @@
           <a:p>
             <a:fld id="{6178E61D-D431-422C-9764-11DAFE33AB63}" type="datetimeFigureOut">
               <a:rPr lang="en-US" dirty="0"/>
-              <a:t>4/20/17</a:t>
+              <a:t>4/20/2017</a:t>
             </a:fld>
             <a:endParaRPr lang="en-US" dirty="0"/>
           </a:p>
@@ -4845,7 +4846,7 @@
           <a:lstStyle/>
           <a:p>
             <a:r>
-              <a:rPr lang="en-US" smtClean="0"/>
+              <a:rPr lang="en-US"/>
               <a:t>Click to edit Master title style</a:t>
             </a:r>
             <a:endParaRPr lang="en-US" dirty="0"/>
@@ -4869,35 +4870,35 @@
           <a:p>
             <a:pPr lvl="0"/>
             <a:r>
-              <a:rPr lang="en-US" smtClean="0"/>
+              <a:rPr lang="en-US"/>
               <a:t>Click to edit Master text styles</a:t>
             </a:r>
           </a:p>
           <a:p>
             <a:pPr lvl="1"/>
             <a:r>
-              <a:rPr lang="en-US" smtClean="0"/>
+              <a:rPr lang="en-US"/>
               <a:t>Second level</a:t>
             </a:r>
           </a:p>
           <a:p>
             <a:pPr lvl="2"/>
             <a:r>
-              <a:rPr lang="en-US" smtClean="0"/>
+              <a:rPr lang="en-US"/>
               <a:t>Third level</a:t>
             </a:r>
           </a:p>
           <a:p>
             <a:pPr lvl="3"/>
             <a:r>
-              <a:rPr lang="en-US" smtClean="0"/>
+              <a:rPr lang="en-US"/>
               <a:t>Fourth level</a:t>
             </a:r>
           </a:p>
           <a:p>
             <a:pPr lvl="4"/>
             <a:r>
-              <a:rPr lang="en-US" smtClean="0"/>
+              <a:rPr lang="en-US"/>
               <a:t>Fifth level</a:t>
             </a:r>
             <a:endParaRPr lang="en-US" dirty="0"/>
@@ -4921,7 +4922,7 @@
           <a:p>
             <a:fld id="{12DE42F4-6EEF-4EF7-8ED4-2208F0F89A08}" type="datetimeFigureOut">
               <a:rPr lang="en-US" dirty="0"/>
-              <a:t>4/20/17</a:t>
+              <a:t>4/20/2017</a:t>
             </a:fld>
             <a:endParaRPr lang="en-US" dirty="0"/>
           </a:p>
@@ -5160,7 +5161,7 @@
           </a:lstStyle>
           <a:p>
             <a:r>
-              <a:rPr lang="en-US" smtClean="0"/>
+              <a:rPr lang="en-US"/>
               <a:t>Click to edit Master title style</a:t>
             </a:r>
             <a:endParaRPr lang="en-US" dirty="0"/>
@@ -5282,7 +5283,7 @@
           <a:p>
             <a:pPr lvl="0"/>
             <a:r>
-              <a:rPr lang="en-US" smtClean="0"/>
+              <a:rPr lang="en-US"/>
               <a:t>Click to edit Master text styles</a:t>
             </a:r>
           </a:p>
@@ -5305,7 +5306,7 @@
           <a:p>
             <a:fld id="{30578ACC-22D6-47C1-A373-4FD133E34F3C}" type="datetimeFigureOut">
               <a:rPr lang="en-US" dirty="0"/>
-              <a:t>4/20/17</a:t>
+              <a:t>4/20/2017</a:t>
             </a:fld>
             <a:endParaRPr lang="en-US" dirty="0"/>
           </a:p>
@@ -5538,7 +5539,7 @@
           <a:lstStyle/>
           <a:p>
             <a:r>
-              <a:rPr lang="en-US" smtClean="0"/>
+              <a:rPr lang="en-US"/>
               <a:t>Click to edit Master title style</a:t>
             </a:r>
             <a:endParaRPr lang="en-US" dirty="0"/>
@@ -5567,35 +5568,35 @@
           <a:p>
             <a:pPr lvl="0"/>
             <a:r>
-              <a:rPr lang="en-US" smtClean="0"/>
+              <a:rPr lang="en-US"/>
               <a:t>Click to edit Master text styles</a:t>
             </a:r>
           </a:p>
           <a:p>
             <a:pPr lvl="1"/>
             <a:r>
-              <a:rPr lang="en-US" smtClean="0"/>
+              <a:rPr lang="en-US"/>
               <a:t>Second level</a:t>
             </a:r>
           </a:p>
           <a:p>
             <a:pPr lvl="2"/>
             <a:r>
-              <a:rPr lang="en-US" smtClean="0"/>
+              <a:rPr lang="en-US"/>
               <a:t>Third level</a:t>
             </a:r>
           </a:p>
           <a:p>
             <a:pPr lvl="3"/>
             <a:r>
-              <a:rPr lang="en-US" smtClean="0"/>
+              <a:rPr lang="en-US"/>
               <a:t>Fourth level</a:t>
             </a:r>
           </a:p>
           <a:p>
             <a:pPr lvl="4"/>
             <a:r>
-              <a:rPr lang="en-US" smtClean="0"/>
+              <a:rPr lang="en-US"/>
               <a:t>Fifth level</a:t>
             </a:r>
             <a:endParaRPr lang="en-US" dirty="0"/>
@@ -5624,35 +5625,35 @@
           <a:p>
             <a:pPr lvl="0"/>
             <a:r>
-              <a:rPr lang="en-US" smtClean="0"/>
+              <a:rPr lang="en-US"/>
               <a:t>Click to edit Master text styles</a:t>
             </a:r>
           </a:p>
           <a:p>
             <a:pPr lvl="1"/>
             <a:r>
-              <a:rPr lang="en-US" smtClean="0"/>
+              <a:rPr lang="en-US"/>
               <a:t>Second level</a:t>
             </a:r>
           </a:p>
           <a:p>
             <a:pPr lvl="2"/>
             <a:r>
-              <a:rPr lang="en-US" smtClean="0"/>
+              <a:rPr lang="en-US"/>
               <a:t>Third level</a:t>
             </a:r>
           </a:p>
           <a:p>
             <a:pPr lvl="3"/>
             <a:r>
-              <a:rPr lang="en-US" smtClean="0"/>
+              <a:rPr lang="en-US"/>
               <a:t>Fourth level</a:t>
             </a:r>
           </a:p>
           <a:p>
             <a:pPr lvl="4"/>
             <a:r>
-              <a:rPr lang="en-US" smtClean="0"/>
+              <a:rPr lang="en-US"/>
               <a:t>Fifth level</a:t>
             </a:r>
             <a:endParaRPr lang="en-US" dirty="0"/>
@@ -5676,7 +5677,7 @@
           <a:p>
             <a:fld id="{4E5A6C69-6797-4E8A-BF37-F2C3751466E9}" type="datetimeFigureOut">
               <a:rPr lang="en-US" dirty="0"/>
-              <a:t>4/20/17</a:t>
+              <a:t>4/20/2017</a:t>
             </a:fld>
             <a:endParaRPr lang="en-US" dirty="0"/>
           </a:p>
@@ -5909,7 +5910,7 @@
           <a:lstStyle/>
           <a:p>
             <a:r>
-              <a:rPr lang="en-US" smtClean="0"/>
+              <a:rPr lang="en-US"/>
               <a:t>Click to edit Master title style</a:t>
             </a:r>
             <a:endParaRPr lang="en-US" dirty="0"/>
@@ -5975,7 +5976,7 @@
           <a:p>
             <a:pPr lvl="0"/>
             <a:r>
-              <a:rPr lang="en-US" smtClean="0"/>
+              <a:rPr lang="en-US"/>
               <a:t>Click to edit Master text styles</a:t>
             </a:r>
           </a:p>
@@ -6003,35 +6004,35 @@
           <a:p>
             <a:pPr lvl="0"/>
             <a:r>
-              <a:rPr lang="en-US" smtClean="0"/>
+              <a:rPr lang="en-US"/>
               <a:t>Click to edit Master text styles</a:t>
             </a:r>
           </a:p>
           <a:p>
             <a:pPr lvl="1"/>
             <a:r>
-              <a:rPr lang="en-US" smtClean="0"/>
+              <a:rPr lang="en-US"/>
               <a:t>Second level</a:t>
             </a:r>
           </a:p>
           <a:p>
             <a:pPr lvl="2"/>
             <a:r>
-              <a:rPr lang="en-US" smtClean="0"/>
+              <a:rPr lang="en-US"/>
               <a:t>Third level</a:t>
             </a:r>
           </a:p>
           <a:p>
             <a:pPr lvl="3"/>
             <a:r>
-              <a:rPr lang="en-US" smtClean="0"/>
+              <a:rPr lang="en-US"/>
               <a:t>Fourth level</a:t>
             </a:r>
           </a:p>
           <a:p>
             <a:pPr lvl="4"/>
             <a:r>
-              <a:rPr lang="en-US" smtClean="0"/>
+              <a:rPr lang="en-US"/>
               <a:t>Fifth level</a:t>
             </a:r>
             <a:endParaRPr lang="en-US" dirty="0"/>
@@ -6097,7 +6098,7 @@
           <a:p>
             <a:pPr lvl="0"/>
             <a:r>
-              <a:rPr lang="en-US" smtClean="0"/>
+              <a:rPr lang="en-US"/>
               <a:t>Click to edit Master text styles</a:t>
             </a:r>
           </a:p>
@@ -6125,35 +6126,35 @@
           <a:p>
             <a:pPr lvl="0"/>
             <a:r>
-              <a:rPr lang="en-US" smtClean="0"/>
+              <a:rPr lang="en-US"/>
               <a:t>Click to edit Master text styles</a:t>
             </a:r>
           </a:p>
           <a:p>
             <a:pPr lvl="1"/>
             <a:r>
-              <a:rPr lang="en-US" smtClean="0"/>
+              <a:rPr lang="en-US"/>
               <a:t>Second level</a:t>
             </a:r>
           </a:p>
           <a:p>
             <a:pPr lvl="2"/>
             <a:r>
-              <a:rPr lang="en-US" smtClean="0"/>
+              <a:rPr lang="en-US"/>
               <a:t>Third level</a:t>
             </a:r>
           </a:p>
           <a:p>
             <a:pPr lvl="3"/>
             <a:r>
-              <a:rPr lang="en-US" smtClean="0"/>
+              <a:rPr lang="en-US"/>
               <a:t>Fourth level</a:t>
             </a:r>
           </a:p>
           <a:p>
             <a:pPr lvl="4"/>
             <a:r>
-              <a:rPr lang="en-US" smtClean="0"/>
+              <a:rPr lang="en-US"/>
               <a:t>Fifth level</a:t>
             </a:r>
             <a:endParaRPr lang="en-US" dirty="0"/>
@@ -6177,7 +6178,7 @@
           <a:p>
             <a:fld id="{D82014A1-A632-4878-A0D3-F52BA7563730}" type="datetimeFigureOut">
               <a:rPr lang="en-US" dirty="0"/>
-              <a:t>4/20/17</a:t>
+              <a:t>4/20/2017</a:t>
             </a:fld>
             <a:endParaRPr lang="en-US" dirty="0"/>
           </a:p>
@@ -6405,7 +6406,7 @@
           <a:lstStyle/>
           <a:p>
             <a:r>
-              <a:rPr lang="en-US" smtClean="0"/>
+              <a:rPr lang="en-US"/>
               <a:t>Click to edit Master title style</a:t>
             </a:r>
             <a:endParaRPr lang="en-US" dirty="0"/>
@@ -6429,7 +6430,7 @@
           <a:p>
             <a:fld id="{CE99F462-093F-4566-844B-4C71F2739DA5}" type="datetimeFigureOut">
               <a:rPr lang="en-US" dirty="0"/>
-              <a:t>4/20/17</a:t>
+              <a:t>4/20/2017</a:t>
             </a:fld>
             <a:endParaRPr lang="en-US" dirty="0"/>
           </a:p>
@@ -6587,7 +6588,7 @@
           <a:p>
             <a:fld id="{3D24A7AC-904D-4781-85BA-7D10C17ED021}" type="datetimeFigureOut">
               <a:rPr lang="en-US" dirty="0"/>
-              <a:t>4/20/17</a:t>
+              <a:t>4/20/2017</a:t>
             </a:fld>
             <a:endParaRPr lang="en-US" dirty="0"/>
           </a:p>
@@ -6826,7 +6827,7 @@
           </a:lstStyle>
           <a:p>
             <a:r>
-              <a:rPr lang="en-US" smtClean="0"/>
+              <a:rPr lang="en-US"/>
               <a:t>Click to edit Master title style</a:t>
             </a:r>
             <a:endParaRPr lang="en-US" dirty="0"/>
@@ -6855,35 +6856,35 @@
           <a:p>
             <a:pPr lvl="0"/>
             <a:r>
-              <a:rPr lang="en-US" smtClean="0"/>
+              <a:rPr lang="en-US"/>
               <a:t>Click to edit Master text styles</a:t>
             </a:r>
           </a:p>
           <a:p>
             <a:pPr lvl="1"/>
             <a:r>
-              <a:rPr lang="en-US" smtClean="0"/>
+              <a:rPr lang="en-US"/>
               <a:t>Second level</a:t>
             </a:r>
           </a:p>
           <a:p>
             <a:pPr lvl="2"/>
             <a:r>
-              <a:rPr lang="en-US" smtClean="0"/>
+              <a:rPr lang="en-US"/>
               <a:t>Third level</a:t>
             </a:r>
           </a:p>
           <a:p>
             <a:pPr lvl="3"/>
             <a:r>
-              <a:rPr lang="en-US" smtClean="0"/>
+              <a:rPr lang="en-US"/>
               <a:t>Fourth level</a:t>
             </a:r>
           </a:p>
           <a:p>
             <a:pPr lvl="4"/>
             <a:r>
-              <a:rPr lang="en-US" smtClean="0"/>
+              <a:rPr lang="en-US"/>
               <a:t>Fifth level</a:t>
             </a:r>
             <a:endParaRPr lang="en-US" dirty="0"/>
@@ -6949,7 +6950,7 @@
           <a:p>
             <a:pPr lvl="0"/>
             <a:r>
-              <a:rPr lang="en-US" smtClean="0"/>
+              <a:rPr lang="en-US"/>
               <a:t>Click to edit Master text styles</a:t>
             </a:r>
           </a:p>
@@ -6972,7 +6973,7 @@
           <a:p>
             <a:fld id="{E331444B-B92B-4E27-8C94-BB93EAF5CB18}" type="datetimeFigureOut">
               <a:rPr lang="en-US" dirty="0"/>
-              <a:t>4/20/17</a:t>
+              <a:t>4/20/2017</a:t>
             </a:fld>
             <a:endParaRPr lang="en-US" dirty="0"/>
           </a:p>
@@ -7211,7 +7212,7 @@
           </a:lstStyle>
           <a:p>
             <a:r>
-              <a:rPr lang="en-US" smtClean="0"/>
+              <a:rPr lang="en-US"/>
               <a:t>Click to edit Master title style</a:t>
             </a:r>
             <a:endParaRPr lang="en-US" dirty="0"/>
@@ -7287,7 +7288,7 @@
           </a:lstStyle>
           <a:p>
             <a:r>
-              <a:rPr lang="en-US" smtClean="0"/>
+              <a:rPr lang="en-US"/>
               <a:t>Drag picture to placeholder or click icon to add</a:t>
             </a:r>
             <a:endParaRPr lang="en-US" dirty="0"/>
@@ -7353,7 +7354,7 @@
           <a:p>
             <a:pPr lvl="0"/>
             <a:r>
-              <a:rPr lang="en-US" smtClean="0"/>
+              <a:rPr lang="en-US"/>
               <a:t>Click to edit Master text styles</a:t>
             </a:r>
           </a:p>
@@ -7376,7 +7377,7 @@
           <a:p>
             <a:fld id="{363EFA5E-FA76-400D-B3DC-F0BA90E6D107}" type="datetimeFigureOut">
               <a:rPr lang="en-US" dirty="0"/>
-              <a:t>4/20/17</a:t>
+              <a:t>4/20/2017</a:t>
             </a:fld>
             <a:endParaRPr lang="en-US" dirty="0"/>
           </a:p>
@@ -7511,7 +7512,7 @@
           <a:lstStyle/>
           <a:p>
             <a:r>
-              <a:rPr lang="en-US" smtClean="0"/>
+              <a:rPr lang="en-US"/>
               <a:t>Click to edit Master title style</a:t>
             </a:r>
             <a:endParaRPr lang="en-US" dirty="0"/>
@@ -7545,35 +7546,35 @@
           <a:p>
             <a:pPr lvl="0"/>
             <a:r>
-              <a:rPr lang="en-US" smtClean="0"/>
+              <a:rPr lang="en-US"/>
               <a:t>Click to edit Master text styles</a:t>
             </a:r>
           </a:p>
           <a:p>
             <a:pPr lvl="1"/>
             <a:r>
-              <a:rPr lang="en-US" smtClean="0"/>
+              <a:rPr lang="en-US"/>
               <a:t>Second level</a:t>
             </a:r>
           </a:p>
           <a:p>
             <a:pPr lvl="2"/>
             <a:r>
-              <a:rPr lang="en-US" smtClean="0"/>
+              <a:rPr lang="en-US"/>
               <a:t>Third level</a:t>
             </a:r>
           </a:p>
           <a:p>
             <a:pPr lvl="3"/>
             <a:r>
-              <a:rPr lang="en-US" smtClean="0"/>
+              <a:rPr lang="en-US"/>
               <a:t>Fourth level</a:t>
             </a:r>
           </a:p>
           <a:p>
             <a:pPr lvl="4"/>
             <a:r>
-              <a:rPr lang="en-US" smtClean="0"/>
+              <a:rPr lang="en-US"/>
               <a:t>Fifth level</a:t>
             </a:r>
             <a:endParaRPr lang="en-US" dirty="0"/>
@@ -7615,7 +7616,7 @@
           <a:p>
             <a:fld id="{9D6E9DEC-419B-4CC5-A080-3B06BD5A8291}" type="datetimeFigureOut">
               <a:rPr lang="en-US" dirty="0"/>
-              <a:t>4/20/17</a:t>
+              <a:t>4/20/2017</a:t>
             </a:fld>
             <a:endParaRPr lang="en-US" dirty="0"/>
           </a:p>
@@ -8039,10 +8040,9 @@
           <a:lstStyle/>
           <a:p>
             <a:r>
-              <a:rPr lang="en-US" dirty="0" smtClean="0"/>
+              <a:rPr lang="en-US" dirty="0"/>
               <a:t>SAB Group Project</a:t>
             </a:r>
-            <a:endParaRPr lang="en-US" dirty="0"/>
           </a:p>
         </p:txBody>
       </p:sp>
@@ -8070,43 +8070,42 @@
           <a:p>
             <a:pPr algn="l"/>
             <a:r>
-              <a:rPr lang="en-US" dirty="0" smtClean="0"/>
+              <a:rPr lang="en-US" dirty="0"/>
               <a:t>Graham Farrell x15044726</a:t>
             </a:r>
           </a:p>
           <a:p>
             <a:pPr algn="l"/>
             <a:r>
-              <a:rPr lang="en-US" dirty="0" smtClean="0"/>
+              <a:rPr lang="en-US" dirty="0"/>
               <a:t>Neil Fitzgerald x15043606</a:t>
             </a:r>
           </a:p>
           <a:p>
             <a:pPr algn="l"/>
             <a:r>
-              <a:rPr lang="en-US" dirty="0" smtClean="0"/>
+              <a:rPr lang="en-US" dirty="0"/>
               <a:t>Alan Gaskin x16130201</a:t>
             </a:r>
           </a:p>
           <a:p>
             <a:pPr algn="l"/>
             <a:r>
-              <a:rPr lang="en-US" dirty="0" err="1" smtClean="0"/>
+              <a:rPr lang="en-US" dirty="0" err="1"/>
               <a:t>Enkhbayar</a:t>
             </a:r>
             <a:r>
-              <a:rPr lang="en-US" dirty="0" smtClean="0"/>
+              <a:rPr lang="en-US" dirty="0"/>
               <a:t> </a:t>
             </a:r>
             <a:r>
-              <a:rPr lang="en-US" dirty="0" err="1" smtClean="0"/>
+              <a:rPr lang="en-US" dirty="0" err="1"/>
               <a:t>Dashtseren</a:t>
             </a:r>
             <a:r>
-              <a:rPr lang="en-US" dirty="0" smtClean="0"/>
+              <a:rPr lang="en-US" dirty="0"/>
               <a:t> x14118173</a:t>
             </a:r>
-            <a:endParaRPr lang="en-US" dirty="0"/>
           </a:p>
         </p:txBody>
       </p:sp>
@@ -8155,56 +8154,508 @@
           <a:bodyPr/>
           <a:lstStyle/>
           <a:p>
-            <a:pPr algn="ctr"/>
-            <a:r>
-              <a:rPr lang="en-US" dirty="0" smtClean="0"/>
-              <a:t>SAB Group Project</a:t>
-            </a:r>
-            <a:endParaRPr lang="en-US" dirty="0"/>
-          </a:p>
-        </p:txBody>
-      </p:sp>
-      <p:sp>
-        <p:nvSpPr>
-          <p:cNvPr id="3" name="Content Placeholder 2"/>
-          <p:cNvSpPr>
-            <a:spLocks noGrp="1"/>
-          </p:cNvSpPr>
-          <p:nvPr>
-            <p:ph idx="1"/>
-          </p:nvPr>
-        </p:nvSpPr>
-        <p:spPr/>
+            <a:r>
+              <a:rPr lang="en-US" dirty="0"/>
+              <a:t>Microsoft Excel</a:t>
+            </a:r>
+          </a:p>
+        </p:txBody>
+      </p:sp>
+      <p:pic>
+        <p:nvPicPr>
+          <p:cNvPr id="5" name="Content Placeholder 4"/>
+          <p:cNvPicPr>
+            <a:picLocks noGrp="1" noChangeAspect="1"/>
+          </p:cNvPicPr>
+          <p:nvPr>
+            <p:ph sz="half" idx="1"/>
+          </p:nvPr>
+        </p:nvPicPr>
+        <p:blipFill>
+          <a:blip r:embed="rId2">
+            <a:extLst>
+              <a:ext uri="{28A0092B-C50C-407E-A947-70E740481C1C}">
+                <a14:useLocalDpi xmlns:a14="http://schemas.microsoft.com/office/drawing/2010/main" val="0"/>
+              </a:ext>
+            </a:extLst>
+          </a:blip>
+          <a:stretch>
+            <a:fillRect/>
+          </a:stretch>
+        </p:blipFill>
+        <p:spPr>
+          <a:xfrm>
+            <a:off x="681038" y="2815084"/>
+            <a:ext cx="4697411" cy="2642294"/>
+          </a:xfrm>
+        </p:spPr>
+      </p:pic>
+      <p:sp>
+        <p:nvSpPr>
+          <p:cNvPr id="4" name="Content Placeholder 3"/>
+          <p:cNvSpPr>
+            <a:spLocks noGrp="1"/>
+          </p:cNvSpPr>
+          <p:nvPr>
+            <p:ph sz="half" idx="2"/>
+          </p:nvPr>
+        </p:nvSpPr>
+        <p:spPr>
+          <a:xfrm>
+            <a:off x="6010980" y="2659601"/>
+            <a:ext cx="4700058" cy="3015058"/>
+          </a:xfrm>
+        </p:spPr>
         <p:txBody>
           <a:bodyPr/>
           <a:lstStyle/>
           <a:p>
-            <a:pPr marL="0" indent="0" algn="ctr">
-              <a:buNone/>
-            </a:pPr>
-            <a:endParaRPr lang="en-US" dirty="0" smtClean="0"/>
-          </a:p>
-          <a:p>
-            <a:pPr marL="0" indent="0" algn="ctr">
-              <a:buNone/>
+            <a:pPr marR="0" lvl="0" defTabSz="914400" eaLnBrk="1" fontAlgn="auto" latinLnBrk="0" hangingPunct="1">
+              <a:lnSpc>
+                <a:spcPct val="100000"/>
+              </a:lnSpc>
+              <a:spcBef>
+                <a:spcPts val="0"/>
+              </a:spcBef>
+              <a:spcAft>
+                <a:spcPts val="0"/>
+              </a:spcAft>
+              <a:buClrTx/>
+              <a:buSzTx/>
+              <a:buFont typeface="Wingdings" charset="2"/>
+              <a:buChar char="v"/>
+              <a:tabLst/>
+              <a:defRPr/>
             </a:pPr>
             <a:endParaRPr lang="en-US" dirty="0"/>
           </a:p>
           <a:p>
+            <a:pPr marR="0" lvl="0" defTabSz="914400" eaLnBrk="1" fontAlgn="auto" latinLnBrk="0" hangingPunct="1">
+              <a:lnSpc>
+                <a:spcPct val="100000"/>
+              </a:lnSpc>
+              <a:spcBef>
+                <a:spcPts val="0"/>
+              </a:spcBef>
+              <a:spcAft>
+                <a:spcPts val="0"/>
+              </a:spcAft>
+              <a:buClrTx/>
+              <a:buSzTx/>
+              <a:buFont typeface="Wingdings" charset="2"/>
+              <a:buChar char="v"/>
+              <a:tabLst/>
+              <a:defRPr/>
+            </a:pPr>
+            <a:endParaRPr lang="en-US" sz="1600" dirty="0"/>
+          </a:p>
+          <a:p>
+            <a:pPr marR="0" lvl="0" defTabSz="914400" eaLnBrk="1" fontAlgn="auto" latinLnBrk="0" hangingPunct="1">
+              <a:lnSpc>
+                <a:spcPct val="100000"/>
+              </a:lnSpc>
+              <a:spcBef>
+                <a:spcPts val="0"/>
+              </a:spcBef>
+              <a:spcAft>
+                <a:spcPts val="0"/>
+              </a:spcAft>
+              <a:buClrTx/>
+              <a:buSzTx/>
+              <a:buFont typeface="Wingdings" charset="2"/>
+              <a:buChar char="v"/>
+              <a:tabLst/>
+              <a:defRPr/>
+            </a:pPr>
+            <a:endParaRPr lang="en-US" sz="1600" dirty="0"/>
+          </a:p>
+          <a:p>
+            <a:pPr marR="0" lvl="0" defTabSz="914400" eaLnBrk="1" fontAlgn="auto" latinLnBrk="0" hangingPunct="1">
+              <a:lnSpc>
+                <a:spcPct val="100000"/>
+              </a:lnSpc>
+              <a:spcBef>
+                <a:spcPts val="0"/>
+              </a:spcBef>
+              <a:spcAft>
+                <a:spcPts val="0"/>
+              </a:spcAft>
+              <a:buClrTx/>
+              <a:buSzTx/>
+              <a:buFont typeface="Wingdings" charset="2"/>
+              <a:buChar char="v"/>
+              <a:tabLst/>
+              <a:defRPr/>
+            </a:pPr>
+            <a:r>
+              <a:rPr lang="en-US" sz="1600" dirty="0"/>
+              <a:t>Microsoft Excel was used with information from Access to create charts.</a:t>
+            </a:r>
+          </a:p>
+          <a:p>
+            <a:pPr marL="0" marR="0" lvl="0" indent="0" defTabSz="914400" eaLnBrk="1" fontAlgn="auto" latinLnBrk="0" hangingPunct="1">
+              <a:lnSpc>
+                <a:spcPct val="100000"/>
+              </a:lnSpc>
+              <a:spcBef>
+                <a:spcPts val="0"/>
+              </a:spcBef>
+              <a:spcAft>
+                <a:spcPts val="0"/>
+              </a:spcAft>
+              <a:buClrTx/>
+              <a:buSzTx/>
+              <a:buNone/>
+              <a:tabLst/>
+              <a:defRPr/>
+            </a:pPr>
+            <a:endParaRPr lang="en-US" sz="1600" dirty="0"/>
+          </a:p>
+          <a:p>
+            <a:pPr marR="0" lvl="0" defTabSz="914400" eaLnBrk="1" fontAlgn="auto" latinLnBrk="0" hangingPunct="1">
+              <a:lnSpc>
+                <a:spcPct val="100000"/>
+              </a:lnSpc>
+              <a:spcBef>
+                <a:spcPts val="0"/>
+              </a:spcBef>
+              <a:spcAft>
+                <a:spcPts val="0"/>
+              </a:spcAft>
+              <a:buClrTx/>
+              <a:buSzTx/>
+              <a:buFont typeface="Wingdings" charset="2"/>
+              <a:buChar char="v"/>
+              <a:tabLst/>
+              <a:defRPr/>
+            </a:pPr>
+            <a:r>
+              <a:rPr lang="en-US" sz="1600" dirty="0"/>
+              <a:t>.</a:t>
+            </a:r>
+          </a:p>
+        </p:txBody>
+      </p:sp>
+    </p:spTree>
+    <p:extLst>
+      <p:ext uri="{BB962C8B-B14F-4D97-AF65-F5344CB8AC3E}">
+        <p14:creationId xmlns:p14="http://schemas.microsoft.com/office/powerpoint/2010/main" val="1851839482"/>
+      </p:ext>
+    </p:extLst>
+  </p:cSld>
+  <p:clrMapOvr>
+    <a:masterClrMapping/>
+  </p:clrMapOvr>
+</p:sld>
+</file>
+
+<file path=ppt/slides/slide11.xml><?xml version="1.0" encoding="utf-8"?>
+<p:sld xmlns:a="http://schemas.openxmlformats.org/drawingml/2006/main" xmlns:r="http://schemas.openxmlformats.org/officeDocument/2006/relationships" xmlns:p="http://schemas.openxmlformats.org/presentationml/2006/main">
+  <p:cSld>
+    <p:spTree>
+      <p:nvGrpSpPr>
+        <p:cNvPr id="1" name=""/>
+        <p:cNvGrpSpPr/>
+        <p:nvPr/>
+      </p:nvGrpSpPr>
+      <p:grpSpPr>
+        <a:xfrm>
+          <a:off x="0" y="0"/>
+          <a:ext cx="0" cy="0"/>
+          <a:chOff x="0" y="0"/>
+          <a:chExt cx="0" cy="0"/>
+        </a:xfrm>
+      </p:grpSpPr>
+      <p:sp>
+        <p:nvSpPr>
+          <p:cNvPr id="2" name="Title 1"/>
+          <p:cNvSpPr>
+            <a:spLocks noGrp="1"/>
+          </p:cNvSpPr>
+          <p:nvPr>
+            <p:ph type="title"/>
+          </p:nvPr>
+        </p:nvSpPr>
+        <p:spPr/>
+        <p:txBody>
+          <a:bodyPr/>
+          <a:lstStyle/>
+          <a:p>
+            <a:r>
+              <a:rPr lang="en-US" dirty="0"/>
+              <a:t>Microsoft Excel</a:t>
+            </a:r>
+          </a:p>
+        </p:txBody>
+      </p:sp>
+      <p:pic>
+        <p:nvPicPr>
+          <p:cNvPr id="5" name="Content Placeholder 4"/>
+          <p:cNvPicPr>
+            <a:picLocks noGrp="1" noChangeAspect="1"/>
+          </p:cNvPicPr>
+          <p:nvPr>
+            <p:ph sz="half" idx="1"/>
+          </p:nvPr>
+        </p:nvPicPr>
+        <p:blipFill>
+          <a:blip r:embed="rId2">
+            <a:extLst>
+              <a:ext uri="{28A0092B-C50C-407E-A947-70E740481C1C}">
+                <a14:useLocalDpi xmlns:a14="http://schemas.microsoft.com/office/drawing/2010/main" val="0"/>
+              </a:ext>
+            </a:extLst>
+          </a:blip>
+          <a:stretch>
+            <a:fillRect/>
+          </a:stretch>
+        </p:blipFill>
+        <p:spPr>
+          <a:xfrm>
+            <a:off x="681038" y="2815084"/>
+            <a:ext cx="4697411" cy="2642294"/>
+          </a:xfrm>
+        </p:spPr>
+      </p:pic>
+      <p:sp>
+        <p:nvSpPr>
+          <p:cNvPr id="4" name="Content Placeholder 3"/>
+          <p:cNvSpPr>
+            <a:spLocks noGrp="1"/>
+          </p:cNvSpPr>
+          <p:nvPr>
+            <p:ph sz="half" idx="2"/>
+          </p:nvPr>
+        </p:nvSpPr>
+        <p:spPr>
+          <a:xfrm>
+            <a:off x="6010980" y="2659601"/>
+            <a:ext cx="4700058" cy="3015058"/>
+          </a:xfrm>
+        </p:spPr>
+        <p:txBody>
+          <a:bodyPr/>
+          <a:lstStyle/>
+          <a:p>
+            <a:pPr marR="0" lvl="0" defTabSz="914400" eaLnBrk="1" fontAlgn="auto" latinLnBrk="0" hangingPunct="1">
+              <a:lnSpc>
+                <a:spcPct val="100000"/>
+              </a:lnSpc>
+              <a:spcBef>
+                <a:spcPts val="0"/>
+              </a:spcBef>
+              <a:spcAft>
+                <a:spcPts val="0"/>
+              </a:spcAft>
+              <a:buClrTx/>
+              <a:buSzTx/>
+              <a:buFont typeface="Wingdings" charset="2"/>
+              <a:buChar char="v"/>
+              <a:tabLst/>
+              <a:defRPr/>
+            </a:pPr>
+            <a:endParaRPr lang="en-US" dirty="0"/>
+          </a:p>
+          <a:p>
+            <a:pPr marR="0" lvl="0" defTabSz="914400" eaLnBrk="1" fontAlgn="auto" latinLnBrk="0" hangingPunct="1">
+              <a:lnSpc>
+                <a:spcPct val="100000"/>
+              </a:lnSpc>
+              <a:spcBef>
+                <a:spcPts val="0"/>
+              </a:spcBef>
+              <a:spcAft>
+                <a:spcPts val="0"/>
+              </a:spcAft>
+              <a:buClrTx/>
+              <a:buSzTx/>
+              <a:buFont typeface="Wingdings" charset="2"/>
+              <a:buChar char="v"/>
+              <a:tabLst/>
+              <a:defRPr/>
+            </a:pPr>
+            <a:endParaRPr lang="en-US" sz="1600" dirty="0"/>
+          </a:p>
+          <a:p>
+            <a:pPr marR="0" lvl="0" defTabSz="914400" eaLnBrk="1" fontAlgn="auto" latinLnBrk="0" hangingPunct="1">
+              <a:lnSpc>
+                <a:spcPct val="100000"/>
+              </a:lnSpc>
+              <a:spcBef>
+                <a:spcPts val="0"/>
+              </a:spcBef>
+              <a:spcAft>
+                <a:spcPts val="0"/>
+              </a:spcAft>
+              <a:buClrTx/>
+              <a:buSzTx/>
+              <a:buFont typeface="Wingdings" charset="2"/>
+              <a:buChar char="v"/>
+              <a:tabLst/>
+              <a:defRPr/>
+            </a:pPr>
+            <a:endParaRPr lang="en-US" sz="1600" dirty="0"/>
+          </a:p>
+          <a:p>
+            <a:pPr marR="0" lvl="0" defTabSz="914400" eaLnBrk="1" fontAlgn="auto" latinLnBrk="0" hangingPunct="1">
+              <a:lnSpc>
+                <a:spcPct val="100000"/>
+              </a:lnSpc>
+              <a:spcBef>
+                <a:spcPts val="0"/>
+              </a:spcBef>
+              <a:spcAft>
+                <a:spcPts val="0"/>
+              </a:spcAft>
+              <a:buClrTx/>
+              <a:buSzTx/>
+              <a:buFont typeface="Wingdings" charset="2"/>
+              <a:buChar char="v"/>
+              <a:tabLst/>
+              <a:defRPr/>
+            </a:pPr>
+            <a:r>
+              <a:rPr lang="en-US" sz="1600" dirty="0"/>
+              <a:t>.</a:t>
+            </a:r>
+          </a:p>
+          <a:p>
+            <a:pPr marL="0" marR="0" lvl="0" indent="0" defTabSz="914400" eaLnBrk="1" fontAlgn="auto" latinLnBrk="0" hangingPunct="1">
+              <a:lnSpc>
+                <a:spcPct val="100000"/>
+              </a:lnSpc>
+              <a:spcBef>
+                <a:spcPts val="0"/>
+              </a:spcBef>
+              <a:spcAft>
+                <a:spcPts val="0"/>
+              </a:spcAft>
+              <a:buClrTx/>
+              <a:buSzTx/>
+              <a:buNone/>
+              <a:tabLst/>
+              <a:defRPr/>
+            </a:pPr>
+            <a:endParaRPr lang="en-US" sz="1600" dirty="0"/>
+          </a:p>
+          <a:p>
+            <a:pPr marR="0" lvl="0" defTabSz="914400" eaLnBrk="1" fontAlgn="auto" latinLnBrk="0" hangingPunct="1">
+              <a:lnSpc>
+                <a:spcPct val="100000"/>
+              </a:lnSpc>
+              <a:spcBef>
+                <a:spcPts val="0"/>
+              </a:spcBef>
+              <a:spcAft>
+                <a:spcPts val="0"/>
+              </a:spcAft>
+              <a:buClrTx/>
+              <a:buSzTx/>
+              <a:buFont typeface="Wingdings" charset="2"/>
+              <a:buChar char="v"/>
+              <a:tabLst/>
+              <a:defRPr/>
+            </a:pPr>
+            <a:r>
+              <a:rPr lang="en-US" sz="1600" dirty="0"/>
+              <a:t>.</a:t>
+            </a:r>
+          </a:p>
+        </p:txBody>
+      </p:sp>
+    </p:spTree>
+    <p:extLst>
+      <p:ext uri="{BB962C8B-B14F-4D97-AF65-F5344CB8AC3E}">
+        <p14:creationId xmlns:p14="http://schemas.microsoft.com/office/powerpoint/2010/main" val="1038625924"/>
+      </p:ext>
+    </p:extLst>
+  </p:cSld>
+  <p:clrMapOvr>
+    <a:masterClrMapping/>
+  </p:clrMapOvr>
+</p:sld>
+</file>
+
+<file path=ppt/slides/slide12.xml><?xml version="1.0" encoding="utf-8"?>
+<p:sld xmlns:a="http://schemas.openxmlformats.org/drawingml/2006/main" xmlns:r="http://schemas.openxmlformats.org/officeDocument/2006/relationships" xmlns:p="http://schemas.openxmlformats.org/presentationml/2006/main">
+  <p:cSld>
+    <p:spTree>
+      <p:nvGrpSpPr>
+        <p:cNvPr id="1" name=""/>
+        <p:cNvGrpSpPr/>
+        <p:nvPr/>
+      </p:nvGrpSpPr>
+      <p:grpSpPr>
+        <a:xfrm>
+          <a:off x="0" y="0"/>
+          <a:ext cx="0" cy="0"/>
+          <a:chOff x="0" y="0"/>
+          <a:chExt cx="0" cy="0"/>
+        </a:xfrm>
+      </p:grpSpPr>
+      <p:sp>
+        <p:nvSpPr>
+          <p:cNvPr id="2" name="Title 1"/>
+          <p:cNvSpPr>
+            <a:spLocks noGrp="1"/>
+          </p:cNvSpPr>
+          <p:nvPr>
+            <p:ph type="title"/>
+          </p:nvPr>
+        </p:nvSpPr>
+        <p:spPr/>
+        <p:txBody>
+          <a:bodyPr/>
+          <a:lstStyle/>
+          <a:p>
+            <a:pPr algn="ctr"/>
+            <a:r>
+              <a:rPr lang="en-US" dirty="0"/>
+              <a:t>SAB Group Project</a:t>
+            </a:r>
+          </a:p>
+        </p:txBody>
+      </p:sp>
+      <p:sp>
+        <p:nvSpPr>
+          <p:cNvPr id="3" name="Content Placeholder 2"/>
+          <p:cNvSpPr>
+            <a:spLocks noGrp="1"/>
+          </p:cNvSpPr>
+          <p:nvPr>
+            <p:ph idx="1"/>
+          </p:nvPr>
+        </p:nvSpPr>
+        <p:spPr/>
+        <p:txBody>
+          <a:bodyPr/>
+          <a:lstStyle/>
+          <a:p>
             <a:pPr marL="0" indent="0" algn="ctr">
               <a:buNone/>
             </a:pPr>
-            <a:endParaRPr lang="en-US" dirty="0" smtClean="0"/>
+            <a:endParaRPr lang="en-US" dirty="0"/>
           </a:p>
           <a:p>
             <a:pPr marL="0" indent="0" algn="ctr">
               <a:buNone/>
             </a:pPr>
-            <a:r>
-              <a:rPr lang="en-US" dirty="0" smtClean="0"/>
+            <a:endParaRPr lang="en-US" dirty="0"/>
+          </a:p>
+          <a:p>
+            <a:pPr marL="0" indent="0" algn="ctr">
+              <a:buNone/>
+            </a:pPr>
+            <a:endParaRPr lang="en-US" dirty="0"/>
+          </a:p>
+          <a:p>
+            <a:pPr marL="0" indent="0" algn="ctr">
+              <a:buNone/>
+            </a:pPr>
+            <a:r>
+              <a:rPr lang="en-US" dirty="0"/>
               <a:t>Thank you for listening.</a:t>
             </a:r>
-            <a:endParaRPr lang="en-US" dirty="0"/>
           </a:p>
         </p:txBody>
       </p:sp>
@@ -8254,10 +8705,9 @@
           <a:lstStyle/>
           <a:p>
             <a:r>
-              <a:rPr lang="en-US" dirty="0" smtClean="0"/>
+              <a:rPr lang="en-US" dirty="0"/>
               <a:t>Trello &amp; GitHub</a:t>
             </a:r>
-            <a:endParaRPr lang="en-US" dirty="0"/>
           </a:p>
         </p:txBody>
       </p:sp>
@@ -8315,7 +8765,7 @@
               <a:buFont typeface="Wingdings" charset="2"/>
               <a:buChar char="v"/>
             </a:pPr>
-            <a:endParaRPr lang="en-US" dirty="0" smtClean="0"/>
+            <a:endParaRPr lang="en-US" dirty="0"/>
           </a:p>
           <a:p>
             <a:pPr marL="285750" indent="-285750">
@@ -8323,7 +8773,7 @@
               <a:buChar char="v"/>
             </a:pPr>
             <a:r>
-              <a:rPr lang="en-US" dirty="0" smtClean="0"/>
+              <a:rPr lang="en-US" dirty="0"/>
               <a:t>Team collaborated using Trello &amp; GitHub.</a:t>
             </a:r>
           </a:p>
@@ -8333,7 +8783,7 @@
               <a:buChar char="v"/>
             </a:pPr>
             <a:r>
-              <a:rPr lang="en-US" dirty="0" smtClean="0"/>
+              <a:rPr lang="en-US" dirty="0"/>
               <a:t>Used Trello to delegate tasks to different team members.</a:t>
             </a:r>
           </a:p>
@@ -8343,16 +8793,8 @@
               <a:buChar char="v"/>
             </a:pPr>
             <a:r>
-              <a:rPr lang="en-US" dirty="0" smtClean="0"/>
-              <a:t>Created </a:t>
-            </a:r>
-            <a:r>
-              <a:rPr lang="en-US" dirty="0" smtClean="0"/>
-              <a:t>a to </a:t>
-            </a:r>
-            <a:r>
-              <a:rPr lang="en-US" dirty="0" smtClean="0"/>
-              <a:t>do list and checklists to keep track of completed tasks.</a:t>
+              <a:rPr lang="en-US" dirty="0"/>
+              <a:t>Created a to do list and checklists to keep track of completed tasks.</a:t>
             </a:r>
           </a:p>
           <a:p>
@@ -8360,7 +8802,7 @@
               <a:buFont typeface="Wingdings" charset="2"/>
               <a:buChar char="v"/>
             </a:pPr>
-            <a:endParaRPr lang="en-US" dirty="0" smtClean="0"/>
+            <a:endParaRPr lang="en-US" dirty="0"/>
           </a:p>
           <a:p>
             <a:pPr marL="285750" indent="-285750">
@@ -8417,10 +8859,9 @@
           <a:lstStyle/>
           <a:p>
             <a:r>
-              <a:rPr lang="en-US" dirty="0" smtClean="0"/>
+              <a:rPr lang="en-US" dirty="0"/>
               <a:t>Trello &amp; GitHub</a:t>
             </a:r>
-            <a:endParaRPr lang="en-US" dirty="0"/>
           </a:p>
         </p:txBody>
       </p:sp>
@@ -8479,7 +8920,7 @@
               <a:buFont typeface="Wingdings" charset="2"/>
               <a:buChar char="v"/>
             </a:pPr>
-            <a:endParaRPr lang="en-US" dirty="0" smtClean="0"/>
+            <a:endParaRPr lang="en-US" dirty="0"/>
           </a:p>
           <a:p>
             <a:pPr marL="285750" indent="-285750">
@@ -8487,7 +8928,7 @@
               <a:buChar char="v"/>
             </a:pPr>
             <a:r>
-              <a:rPr lang="en-US" dirty="0" smtClean="0"/>
+              <a:rPr lang="en-US" dirty="0"/>
               <a:t>GitHub was used as a second collaboration tool.</a:t>
             </a:r>
           </a:p>
@@ -8497,7 +8938,7 @@
               <a:buChar char="v"/>
             </a:pPr>
             <a:r>
-              <a:rPr lang="en-US" dirty="0" smtClean="0"/>
+              <a:rPr lang="en-US" dirty="0"/>
               <a:t>Team members were able to access &amp; share files using this.</a:t>
             </a:r>
           </a:p>
@@ -8507,15 +8948,15 @@
               <a:buChar char="v"/>
             </a:pPr>
             <a:r>
-              <a:rPr lang="en-US" dirty="0" smtClean="0"/>
+              <a:rPr lang="en-US" dirty="0"/>
               <a:t>Used both CLI &amp; GUI to work with </a:t>
             </a:r>
             <a:r>
-              <a:rPr lang="en-US" dirty="0" err="1" smtClean="0"/>
+              <a:rPr lang="en-US" dirty="0" err="1"/>
               <a:t>Git</a:t>
             </a:r>
             <a:r>
-              <a:rPr lang="en-US" dirty="0" smtClean="0"/>
+              <a:rPr lang="en-US" dirty="0"/>
               <a:t> &amp; GitHub.</a:t>
             </a:r>
           </a:p>
@@ -8524,7 +8965,7 @@
               <a:buFont typeface="Wingdings" charset="2"/>
               <a:buChar char="v"/>
             </a:pPr>
-            <a:endParaRPr lang="en-US" dirty="0" smtClean="0"/>
+            <a:endParaRPr lang="en-US" dirty="0"/>
           </a:p>
           <a:p>
             <a:pPr marL="285750" indent="-285750">
@@ -8581,10 +9022,9 @@
           <a:lstStyle/>
           <a:p>
             <a:r>
-              <a:rPr lang="en-US" dirty="0" smtClean="0"/>
+              <a:rPr lang="en-US" dirty="0"/>
               <a:t>MCTV Logo &amp; Website</a:t>
             </a:r>
-            <a:endParaRPr lang="en-US" dirty="0"/>
           </a:p>
         </p:txBody>
       </p:sp>
@@ -8654,27 +9094,7 @@
               <a:tabLst/>
               <a:defRPr/>
             </a:pPr>
-            <a:endParaRPr lang="en-US" dirty="0" smtClean="0"/>
-          </a:p>
-          <a:p>
-            <a:pPr marR="0" lvl="0" defTabSz="914400" eaLnBrk="1" fontAlgn="auto" latinLnBrk="0" hangingPunct="1">
-              <a:lnSpc>
-                <a:spcPct val="100000"/>
-              </a:lnSpc>
-              <a:spcBef>
-                <a:spcPts val="0"/>
-              </a:spcBef>
-              <a:spcAft>
-                <a:spcPts val="0"/>
-              </a:spcAft>
-              <a:buClrTx/>
-              <a:buSzTx/>
-              <a:buFont typeface="Wingdings" charset="2"/>
-              <a:buChar char="v"/>
-              <a:tabLst/>
-              <a:defRPr/>
-            </a:pPr>
-            <a:endParaRPr lang="en-US" sz="1600" dirty="0" smtClean="0"/>
+            <a:endParaRPr lang="en-US" dirty="0"/>
           </a:p>
           <a:p>
             <a:pPr marR="0" lvl="0" defTabSz="914400" eaLnBrk="1" fontAlgn="auto" latinLnBrk="0" hangingPunct="1">
@@ -8714,29 +9134,7 @@
               <a:tabLst/>
               <a:defRPr/>
             </a:pPr>
-            <a:r>
-              <a:rPr lang="en-US" sz="1600" dirty="0" smtClean="0"/>
-              <a:t>Adobe Fireworks was used to create logo for MCTV website.</a:t>
-            </a:r>
-          </a:p>
-          <a:p>
-            <a:pPr marL="0" marR="0" lvl="0" indent="0" defTabSz="914400" eaLnBrk="1" fontAlgn="auto" latinLnBrk="0" hangingPunct="1">
-              <a:lnSpc>
-                <a:spcPct val="100000"/>
-              </a:lnSpc>
-              <a:spcBef>
-                <a:spcPts val="0"/>
-              </a:spcBef>
-              <a:spcAft>
-                <a:spcPts val="0"/>
-              </a:spcAft>
-              <a:buClrTx/>
-              <a:buSzTx/>
-              <a:buNone/>
-              <a:tabLst/>
-              <a:defRPr/>
-            </a:pPr>
-            <a:endParaRPr lang="en-US" sz="1600" dirty="0" smtClean="0"/>
+            <a:endParaRPr lang="en-US" sz="1600" dirty="0"/>
           </a:p>
           <a:p>
             <a:pPr marR="0" lvl="0" defTabSz="914400" eaLnBrk="1" fontAlgn="auto" latinLnBrk="0" hangingPunct="1">
@@ -8757,14 +9155,55 @@
               <a:defRPr/>
             </a:pPr>
             <a:r>
-              <a:rPr lang="en-US" sz="1600" dirty="0" err="1" smtClean="0"/>
+              <a:rPr lang="en-US" sz="1600" dirty="0"/>
+              <a:t>Adobe Fireworks was used to create logo for MCTV website.</a:t>
+            </a:r>
+          </a:p>
+          <a:p>
+            <a:pPr marL="0" marR="0" lvl="0" indent="0" defTabSz="914400" eaLnBrk="1" fontAlgn="auto" latinLnBrk="0" hangingPunct="1">
+              <a:lnSpc>
+                <a:spcPct val="100000"/>
+              </a:lnSpc>
+              <a:spcBef>
+                <a:spcPts val="0"/>
+              </a:spcBef>
+              <a:spcAft>
+                <a:spcPts val="0"/>
+              </a:spcAft>
+              <a:buClrTx/>
+              <a:buSzTx/>
+              <a:buNone/>
+              <a:tabLst/>
+              <a:defRPr/>
+            </a:pPr>
+            <a:endParaRPr lang="en-US" sz="1600" dirty="0"/>
+          </a:p>
+          <a:p>
+            <a:pPr marR="0" lvl="0" defTabSz="914400" eaLnBrk="1" fontAlgn="auto" latinLnBrk="0" hangingPunct="1">
+              <a:lnSpc>
+                <a:spcPct val="100000"/>
+              </a:lnSpc>
+              <a:spcBef>
+                <a:spcPts val="0"/>
+              </a:spcBef>
+              <a:spcAft>
+                <a:spcPts val="0"/>
+              </a:spcAft>
+              <a:buClrTx/>
+              <a:buSzTx/>
+              <a:buFont typeface="Wingdings" charset="2"/>
+              <a:buChar char="v"/>
+              <a:tabLst/>
+              <a:defRPr/>
+            </a:pPr>
+            <a:r>
+              <a:rPr lang="en-US" sz="1600" dirty="0" err="1"/>
               <a:t>Colours</a:t>
             </a:r>
             <a:r>
-              <a:rPr lang="en-US" sz="1600" dirty="0" smtClean="0"/>
+              <a:rPr lang="en-US" sz="1600" dirty="0"/>
               <a:t> used for logo were taken from website to keep everything looking uniform.</a:t>
             </a:r>
-            <a:endParaRPr lang="en-US" sz="1600" dirty="0"/>
           </a:p>
         </p:txBody>
       </p:sp>
@@ -8814,10 +9253,9 @@
           <a:lstStyle/>
           <a:p>
             <a:r>
-              <a:rPr lang="en-US" dirty="0" smtClean="0"/>
+              <a:rPr lang="en-US" dirty="0"/>
               <a:t>MCTV Logo &amp; Website</a:t>
             </a:r>
-            <a:endParaRPr lang="en-US" dirty="0"/>
           </a:p>
         </p:txBody>
       </p:sp>
@@ -8887,7 +9325,7 @@
               <a:tabLst/>
               <a:defRPr/>
             </a:pPr>
-            <a:endParaRPr lang="en-US" dirty="0" smtClean="0"/>
+            <a:endParaRPr lang="en-US" dirty="0"/>
           </a:p>
           <a:p>
             <a:pPr marR="0" lvl="0" defTabSz="914400" eaLnBrk="1" fontAlgn="auto" latinLnBrk="0" hangingPunct="1">
@@ -8907,7 +9345,7 @@
               <a:tabLst/>
               <a:defRPr/>
             </a:pPr>
-            <a:endParaRPr lang="en-US" sz="1600" dirty="0" smtClean="0"/>
+            <a:endParaRPr lang="en-US" sz="1600" dirty="0"/>
           </a:p>
           <a:p>
             <a:pPr marR="0" lvl="0" defTabSz="914400" eaLnBrk="1" fontAlgn="auto" latinLnBrk="0" hangingPunct="1">
@@ -8927,7 +9365,7 @@
               <a:tabLst/>
               <a:defRPr/>
             </a:pPr>
-            <a:endParaRPr lang="en-US" sz="1600" dirty="0" smtClean="0"/>
+            <a:endParaRPr lang="en-US" sz="1600" dirty="0"/>
           </a:p>
           <a:p>
             <a:pPr marR="0" lvl="0" defTabSz="914400" eaLnBrk="1" fontAlgn="auto" latinLnBrk="0" hangingPunct="1">
@@ -8948,7 +9386,7 @@
               <a:defRPr/>
             </a:pPr>
             <a:r>
-              <a:rPr lang="en-US" sz="1600" dirty="0" smtClean="0"/>
+              <a:rPr lang="en-US" sz="1600" dirty="0"/>
               <a:t>Created the home page for the MCTV website integrating the company logo.</a:t>
             </a:r>
           </a:p>
@@ -8969,7 +9407,7 @@
               <a:tabLst/>
               <a:defRPr/>
             </a:pPr>
-            <a:endParaRPr lang="en-US" sz="1600" dirty="0" smtClean="0"/>
+            <a:endParaRPr lang="en-US" sz="1600" dirty="0"/>
           </a:p>
           <a:p>
             <a:pPr marR="0" lvl="0" defTabSz="914400" eaLnBrk="1" fontAlgn="auto" latinLnBrk="0" hangingPunct="1">
@@ -8990,10 +9428,9 @@
               <a:defRPr/>
             </a:pPr>
             <a:r>
-              <a:rPr lang="en-US" sz="1600" dirty="0" smtClean="0"/>
+              <a:rPr lang="en-US" sz="1600" dirty="0"/>
               <a:t>Website is responsive as we used CSS for the styling.</a:t>
             </a:r>
-            <a:endParaRPr lang="en-US" sz="1600" dirty="0"/>
           </a:p>
         </p:txBody>
       </p:sp>
@@ -9043,10 +9480,9 @@
           <a:lstStyle/>
           <a:p>
             <a:r>
-              <a:rPr lang="en-US" dirty="0" smtClean="0"/>
+              <a:rPr lang="en-US" dirty="0"/>
               <a:t>Access Database &amp; UML</a:t>
             </a:r>
-            <a:endParaRPr lang="en-US" dirty="0"/>
           </a:p>
         </p:txBody>
       </p:sp>
@@ -9095,7 +9531,7 @@
               <a:buChar char="v"/>
             </a:pPr>
             <a:r>
-              <a:rPr lang="en-US" dirty="0" smtClean="0"/>
+              <a:rPr lang="en-US" dirty="0"/>
               <a:t>Microsoft Access was used to build the database for the company.</a:t>
             </a:r>
           </a:p>
@@ -9105,7 +9541,7 @@
               <a:buChar char="v"/>
             </a:pPr>
             <a:r>
-              <a:rPr lang="en-US" dirty="0" smtClean="0"/>
+              <a:rPr lang="en-US" dirty="0"/>
               <a:t>Created tables, queries, forms &amp; reports in Access.</a:t>
             </a:r>
           </a:p>
@@ -9115,18 +9551,9 @@
               <a:buChar char="v"/>
             </a:pPr>
             <a:r>
-              <a:rPr lang="en-US" dirty="0" smtClean="0"/>
-              <a:t>Used logo created for website in </a:t>
-            </a:r>
-            <a:r>
-              <a:rPr lang="en-US" dirty="0" smtClean="0"/>
-              <a:t>the database </a:t>
-            </a:r>
-            <a:r>
-              <a:rPr lang="en-US" dirty="0" smtClean="0"/>
-              <a:t>too.</a:t>
-            </a:r>
-            <a:endParaRPr lang="en-US" dirty="0"/>
+              <a:rPr lang="en-US" dirty="0"/>
+              <a:t>Used logo created for website in the database too.</a:t>
+            </a:r>
           </a:p>
         </p:txBody>
       </p:sp>
@@ -9176,10 +9603,9 @@
           <a:lstStyle/>
           <a:p>
             <a:r>
-              <a:rPr lang="en-US" dirty="0" smtClean="0"/>
+              <a:rPr lang="en-US" dirty="0"/>
               <a:t>Access Database &amp; UML</a:t>
             </a:r>
-            <a:endParaRPr lang="en-US" dirty="0"/>
           </a:p>
         </p:txBody>
       </p:sp>
@@ -9228,7 +9654,7 @@
               <a:buChar char="v"/>
             </a:pPr>
             <a:r>
-              <a:rPr lang="en-US" dirty="0" smtClean="0"/>
+              <a:rPr lang="en-US" dirty="0"/>
               <a:t>Created UML for Access database.</a:t>
             </a:r>
           </a:p>
@@ -9238,13 +9664,96 @@
               <a:buChar char="v"/>
             </a:pPr>
             <a:r>
-              <a:rPr lang="en-US" dirty="0" smtClean="0"/>
-              <a:t>.</a:t>
-            </a:r>
-            <a:endParaRPr lang="en-US" dirty="0"/>
-          </a:p>
-        </p:txBody>
-      </p:sp>
+              <a:rPr lang="en-US" dirty="0"/>
+              <a:t>5 tables</a:t>
+            </a:r>
+          </a:p>
+          <a:p>
+            <a:pPr marL="285750" indent="-285750">
+              <a:buFont typeface="Wingdings" charset="2"/>
+              <a:buChar char="v"/>
+            </a:pPr>
+            <a:r>
+              <a:rPr lang="en-US" dirty="0"/>
+              <a:t>5 forms</a:t>
+            </a:r>
+          </a:p>
+          <a:p>
+            <a:pPr marL="285750" indent="-285750">
+              <a:buFont typeface="Wingdings" charset="2"/>
+              <a:buChar char="v"/>
+            </a:pPr>
+            <a:r>
+              <a:rPr lang="en-US" dirty="0"/>
+              <a:t>6 queries </a:t>
+            </a:r>
+          </a:p>
+          <a:p>
+            <a:pPr marL="285750" indent="-285750">
+              <a:buFont typeface="Wingdings" charset="2"/>
+              <a:buChar char="v"/>
+            </a:pPr>
+            <a:r>
+              <a:rPr lang="en-US" dirty="0"/>
+              <a:t>3 reports</a:t>
+            </a:r>
+          </a:p>
+          <a:p>
+            <a:pPr marL="285750" indent="-285750">
+              <a:buFont typeface="Wingdings" charset="2"/>
+              <a:buChar char="v"/>
+            </a:pPr>
+            <a:r>
+              <a:rPr lang="en-US" dirty="0"/>
+              <a:t>1 relationships </a:t>
+            </a:r>
+          </a:p>
+          <a:p>
+            <a:pPr marL="285750" indent="-285750">
+              <a:buFont typeface="Wingdings" charset="2"/>
+              <a:buChar char="v"/>
+            </a:pPr>
+            <a:r>
+              <a:rPr lang="en-US" dirty="0"/>
+              <a:t>Login screen</a:t>
+            </a:r>
+          </a:p>
+          <a:p>
+            <a:pPr marL="285750" indent="-285750">
+              <a:buFont typeface="Wingdings" charset="2"/>
+              <a:buChar char="v"/>
+            </a:pPr>
+            <a:r>
+              <a:rPr lang="en-US" dirty="0"/>
+              <a:t>Main menu </a:t>
+            </a:r>
+          </a:p>
+        </p:txBody>
+      </p:sp>
+      <p:pic>
+        <p:nvPicPr>
+          <p:cNvPr id="3" name="Picture 2"/>
+          <p:cNvPicPr>
+            <a:picLocks noChangeAspect="1"/>
+          </p:cNvPicPr>
+          <p:nvPr/>
+        </p:nvPicPr>
+        <p:blipFill>
+          <a:blip r:embed="rId3"/>
+          <a:stretch>
+            <a:fillRect/>
+          </a:stretch>
+        </p:blipFill>
+        <p:spPr>
+          <a:xfrm>
+            <a:off x="4868333" y="2336873"/>
+            <a:ext cx="6249682" cy="4033702"/>
+          </a:xfrm>
+          <a:prstGeom prst="rect">
+            <a:avLst/>
+          </a:prstGeom>
+        </p:spPr>
+      </p:pic>
     </p:spTree>
     <p:extLst>
       <p:ext uri="{BB962C8B-B14F-4D97-AF65-F5344CB8AC3E}">
@@ -9291,193 +9800,93 @@
           <a:lstStyle/>
           <a:p>
             <a:r>
-              <a:rPr lang="en-US" dirty="0" smtClean="0"/>
-              <a:t>Microsoft Excel</a:t>
-            </a:r>
-            <a:endParaRPr lang="en-US" dirty="0"/>
+              <a:rPr lang="en-IE" dirty="0"/>
+              <a:t>Visual Basic Code </a:t>
+            </a:r>
           </a:p>
         </p:txBody>
       </p:sp>
       <p:pic>
         <p:nvPicPr>
-          <p:cNvPr id="5" name="Content Placeholder 4"/>
+          <p:cNvPr id="5" name="Picture Placeholder 4"/>
           <p:cNvPicPr>
             <a:picLocks noGrp="1" noChangeAspect="1"/>
           </p:cNvPicPr>
           <p:nvPr>
-            <p:ph sz="half" idx="1"/>
+            <p:ph type="pic" idx="1"/>
           </p:nvPr>
         </p:nvPicPr>
         <p:blipFill>
-          <a:blip r:embed="rId2">
-            <a:extLst>
-              <a:ext uri="{28A0092B-C50C-407E-A947-70E740481C1C}">
-                <a14:useLocalDpi xmlns:a14="http://schemas.microsoft.com/office/drawing/2010/main" val="0"/>
-              </a:ext>
-            </a:extLst>
-          </a:blip>
+          <a:blip r:embed="rId2"/>
+          <a:srcRect l="28798" r="28798"/>
           <a:stretch>
             <a:fillRect/>
           </a:stretch>
         </p:blipFill>
         <p:spPr>
           <a:xfrm>
-            <a:off x="681038" y="2815084"/>
-            <a:ext cx="4697411" cy="2642294"/>
+            <a:off x="4697511" y="2336876"/>
+            <a:ext cx="5425849" cy="3599312"/>
           </a:xfrm>
         </p:spPr>
       </p:pic>
       <p:sp>
         <p:nvSpPr>
-          <p:cNvPr id="4" name="Content Placeholder 3"/>
-          <p:cNvSpPr>
-            <a:spLocks noGrp="1"/>
-          </p:cNvSpPr>
-          <p:nvPr>
-            <p:ph sz="half" idx="2"/>
-          </p:nvPr>
-        </p:nvSpPr>
-        <p:spPr>
-          <a:xfrm>
-            <a:off x="6010980" y="2659601"/>
-            <a:ext cx="4700058" cy="3015058"/>
-          </a:xfrm>
-        </p:spPr>
+          <p:cNvPr id="4" name="Text Placeholder 3"/>
+          <p:cNvSpPr>
+            <a:spLocks noGrp="1"/>
+          </p:cNvSpPr>
+          <p:nvPr>
+            <p:ph type="body" sz="half" idx="2"/>
+          </p:nvPr>
+        </p:nvSpPr>
+        <p:spPr/>
         <p:txBody>
           <a:bodyPr/>
           <a:lstStyle/>
           <a:p>
-            <a:pPr marR="0" lvl="0" defTabSz="914400" eaLnBrk="1" fontAlgn="auto" latinLnBrk="0" hangingPunct="1">
-              <a:lnSpc>
-                <a:spcPct val="100000"/>
-              </a:lnSpc>
-              <a:spcBef>
-                <a:spcPts val="0"/>
-              </a:spcBef>
-              <a:spcAft>
-                <a:spcPts val="0"/>
-              </a:spcAft>
-              <a:buClrTx/>
-              <a:buSzTx/>
+            <a:pPr marL="285750" indent="-285750">
               <a:buFont typeface="Wingdings" charset="2"/>
               <a:buChar char="v"/>
-              <a:tabLst/>
-              <a:defRPr/>
             </a:pPr>
-            <a:endParaRPr lang="en-US" dirty="0" smtClean="0"/>
-          </a:p>
-          <a:p>
-            <a:pPr marR="0" lvl="0" defTabSz="914400" eaLnBrk="1" fontAlgn="auto" latinLnBrk="0" hangingPunct="1">
-              <a:lnSpc>
-                <a:spcPct val="100000"/>
-              </a:lnSpc>
-              <a:spcBef>
-                <a:spcPts val="0"/>
-              </a:spcBef>
-              <a:spcAft>
-                <a:spcPts val="0"/>
-              </a:spcAft>
-              <a:buClrTx/>
-              <a:buSzTx/>
-              <a:buFont typeface="Wingdings" charset="2"/>
-              <a:buChar char="v"/>
-              <a:tabLst/>
-              <a:defRPr/>
-            </a:pPr>
-            <a:endParaRPr lang="en-US" sz="1600" dirty="0" smtClean="0"/>
-          </a:p>
-          <a:p>
-            <a:pPr marR="0" lvl="0" defTabSz="914400" eaLnBrk="1" fontAlgn="auto" latinLnBrk="0" hangingPunct="1">
-              <a:lnSpc>
-                <a:spcPct val="100000"/>
-              </a:lnSpc>
-              <a:spcBef>
-                <a:spcPts val="0"/>
-              </a:spcBef>
-              <a:spcAft>
-                <a:spcPts val="0"/>
-              </a:spcAft>
-              <a:buClrTx/>
-              <a:buSzTx/>
-              <a:buFont typeface="Wingdings" charset="2"/>
-              <a:buChar char="v"/>
-              <a:tabLst/>
-              <a:defRPr/>
-            </a:pPr>
-            <a:endParaRPr lang="en-US" sz="1600" dirty="0"/>
-          </a:p>
-          <a:p>
-            <a:pPr marR="0" lvl="0" defTabSz="914400" eaLnBrk="1" fontAlgn="auto" latinLnBrk="0" hangingPunct="1">
-              <a:lnSpc>
-                <a:spcPct val="100000"/>
-              </a:lnSpc>
-              <a:spcBef>
-                <a:spcPts val="0"/>
-              </a:spcBef>
-              <a:spcAft>
-                <a:spcPts val="0"/>
-              </a:spcAft>
-              <a:buClrTx/>
-              <a:buSzTx/>
-              <a:buFont typeface="Wingdings" charset="2"/>
-              <a:buChar char="v"/>
-              <a:tabLst/>
-              <a:defRPr/>
-            </a:pPr>
-            <a:r>
-              <a:rPr lang="en-US" sz="1600" dirty="0" smtClean="0"/>
-              <a:t>Microsoft Excel was used with information from Access to create charts.</a:t>
-            </a:r>
-          </a:p>
-          <a:p>
-            <a:pPr marL="0" marR="0" lvl="0" indent="0" defTabSz="914400" eaLnBrk="1" fontAlgn="auto" latinLnBrk="0" hangingPunct="1">
-              <a:lnSpc>
-                <a:spcPct val="100000"/>
-              </a:lnSpc>
-              <a:spcBef>
-                <a:spcPts val="0"/>
-              </a:spcBef>
-              <a:spcAft>
-                <a:spcPts val="0"/>
-              </a:spcAft>
-              <a:buClrTx/>
-              <a:buSzTx/>
-              <a:buNone/>
-              <a:tabLst/>
-              <a:defRPr/>
-            </a:pPr>
-            <a:endParaRPr lang="en-US" sz="1600" dirty="0" smtClean="0"/>
-          </a:p>
-          <a:p>
-            <a:pPr marR="0" lvl="0" defTabSz="914400" eaLnBrk="1" fontAlgn="auto" latinLnBrk="0" hangingPunct="1">
-              <a:lnSpc>
-                <a:spcPct val="100000"/>
-              </a:lnSpc>
-              <a:spcBef>
-                <a:spcPts val="0"/>
-              </a:spcBef>
-              <a:spcAft>
-                <a:spcPts val="0"/>
-              </a:spcAft>
-              <a:buClrTx/>
-              <a:buSzTx/>
-              <a:buFont typeface="Wingdings" charset="2"/>
-              <a:buChar char="v"/>
-              <a:tabLst/>
-              <a:defRPr/>
-            </a:pPr>
-            <a:r>
-              <a:rPr lang="en-US" sz="1600" dirty="0" smtClean="0"/>
-              <a:t>.</a:t>
-            </a:r>
-            <a:endParaRPr lang="en-US" sz="1600" dirty="0"/>
-          </a:p>
-        </p:txBody>
-      </p:sp>
+            <a:r>
+              <a:rPr lang="en-US" dirty="0"/>
+              <a:t>Used Visual Basic Code for Login Form </a:t>
+            </a:r>
+          </a:p>
+          <a:p>
+            <a:endParaRPr lang="en-US" dirty="0"/>
+          </a:p>
+        </p:txBody>
+      </p:sp>
+      <p:pic>
+        <p:nvPicPr>
+          <p:cNvPr id="6" name="Picture 5"/>
+          <p:cNvPicPr>
+            <a:picLocks noChangeAspect="1"/>
+          </p:cNvPicPr>
+          <p:nvPr/>
+        </p:nvPicPr>
+        <p:blipFill>
+          <a:blip r:embed="rId3"/>
+          <a:stretch>
+            <a:fillRect/>
+          </a:stretch>
+        </p:blipFill>
+        <p:spPr>
+          <a:xfrm>
+            <a:off x="4697511" y="2336873"/>
+            <a:ext cx="7330366" cy="4365197"/>
+          </a:xfrm>
+          <a:prstGeom prst="rect">
+            <a:avLst/>
+          </a:prstGeom>
+        </p:spPr>
+      </p:pic>
     </p:spTree>
     <p:extLst>
       <p:ext uri="{BB962C8B-B14F-4D97-AF65-F5344CB8AC3E}">
-        <p14:creationId xmlns:p14="http://schemas.microsoft.com/office/powerpoint/2010/main" val="1851839482"/>
+        <p14:creationId xmlns:p14="http://schemas.microsoft.com/office/powerpoint/2010/main" val="2202288510"/>
       </p:ext>
     </p:extLst>
   </p:cSld>
@@ -9520,193 +9929,69 @@
           <a:lstStyle/>
           <a:p>
             <a:r>
-              <a:rPr lang="en-US" dirty="0" smtClean="0"/>
-              <a:t>Microsoft Excel</a:t>
-            </a:r>
-            <a:endParaRPr lang="en-US" dirty="0"/>
+              <a:rPr lang="en-IE" dirty="0"/>
+              <a:t>Relationships Between Tables </a:t>
+            </a:r>
           </a:p>
         </p:txBody>
       </p:sp>
       <p:pic>
         <p:nvPicPr>
-          <p:cNvPr id="5" name="Content Placeholder 4"/>
+          <p:cNvPr id="5" name="Picture Placeholder 4"/>
           <p:cNvPicPr>
             <a:picLocks noGrp="1" noChangeAspect="1"/>
           </p:cNvPicPr>
           <p:nvPr>
-            <p:ph sz="half" idx="1"/>
+            <p:ph type="pic" idx="1"/>
           </p:nvPr>
         </p:nvPicPr>
         <p:blipFill>
-          <a:blip r:embed="rId2">
-            <a:extLst>
-              <a:ext uri="{28A0092B-C50C-407E-A947-70E740481C1C}">
-                <a14:useLocalDpi xmlns:a14="http://schemas.microsoft.com/office/drawing/2010/main" val="0"/>
-              </a:ext>
-            </a:extLst>
-          </a:blip>
+          <a:blip r:embed="rId2"/>
+          <a:srcRect t="7725" b="7725"/>
           <a:stretch>
             <a:fillRect/>
           </a:stretch>
         </p:blipFill>
-        <p:spPr>
-          <a:xfrm>
-            <a:off x="681038" y="2815084"/>
-            <a:ext cx="4697411" cy="2642294"/>
-          </a:xfrm>
-        </p:spPr>
+        <p:spPr/>
       </p:pic>
       <p:sp>
         <p:nvSpPr>
-          <p:cNvPr id="4" name="Content Placeholder 3"/>
-          <p:cNvSpPr>
-            <a:spLocks noGrp="1"/>
-          </p:cNvSpPr>
-          <p:nvPr>
-            <p:ph sz="half" idx="2"/>
-          </p:nvPr>
-        </p:nvSpPr>
-        <p:spPr>
-          <a:xfrm>
-            <a:off x="6010980" y="2659601"/>
-            <a:ext cx="4700058" cy="3015058"/>
-          </a:xfrm>
-        </p:spPr>
+          <p:cNvPr id="4" name="Text Placeholder 3"/>
+          <p:cNvSpPr>
+            <a:spLocks noGrp="1"/>
+          </p:cNvSpPr>
+          <p:nvPr>
+            <p:ph type="body" sz="half" idx="2"/>
+          </p:nvPr>
+        </p:nvSpPr>
+        <p:spPr/>
         <p:txBody>
           <a:bodyPr/>
           <a:lstStyle/>
           <a:p>
-            <a:pPr marR="0" lvl="0" defTabSz="914400" eaLnBrk="1" fontAlgn="auto" latinLnBrk="0" hangingPunct="1">
-              <a:lnSpc>
-                <a:spcPct val="100000"/>
-              </a:lnSpc>
-              <a:spcBef>
-                <a:spcPts val="0"/>
-              </a:spcBef>
-              <a:spcAft>
-                <a:spcPts val="0"/>
-              </a:spcAft>
-              <a:buClrTx/>
-              <a:buSzTx/>
+            <a:pPr marL="285750" indent="-285750">
               <a:buFont typeface="Wingdings" charset="2"/>
               <a:buChar char="v"/>
-              <a:tabLst/>
-              <a:defRPr/>
             </a:pPr>
-            <a:endParaRPr lang="en-US" dirty="0" smtClean="0"/>
-          </a:p>
-          <a:p>
-            <a:pPr marR="0" lvl="0" defTabSz="914400" eaLnBrk="1" fontAlgn="auto" latinLnBrk="0" hangingPunct="1">
-              <a:lnSpc>
-                <a:spcPct val="100000"/>
-              </a:lnSpc>
-              <a:spcBef>
-                <a:spcPts val="0"/>
-              </a:spcBef>
-              <a:spcAft>
-                <a:spcPts val="0"/>
-              </a:spcAft>
-              <a:buClrTx/>
-              <a:buSzTx/>
+            <a:endParaRPr lang="en-US" dirty="0"/>
+          </a:p>
+          <a:p>
+            <a:pPr marL="285750" indent="-285750">
               <a:buFont typeface="Wingdings" charset="2"/>
               <a:buChar char="v"/>
-              <a:tabLst/>
-              <a:defRPr/>
             </a:pPr>
-            <a:endParaRPr lang="en-US" sz="1600" dirty="0" smtClean="0"/>
-          </a:p>
-          <a:p>
-            <a:pPr marR="0" lvl="0" defTabSz="914400" eaLnBrk="1" fontAlgn="auto" latinLnBrk="0" hangingPunct="1">
-              <a:lnSpc>
-                <a:spcPct val="100000"/>
-              </a:lnSpc>
-              <a:spcBef>
-                <a:spcPts val="0"/>
-              </a:spcBef>
-              <a:spcAft>
-                <a:spcPts val="0"/>
-              </a:spcAft>
-              <a:buClrTx/>
-              <a:buSzTx/>
-              <a:buFont typeface="Wingdings" charset="2"/>
-              <a:buChar char="v"/>
-              <a:tabLst/>
-              <a:defRPr/>
-            </a:pPr>
-            <a:endParaRPr lang="en-US" sz="1600" dirty="0"/>
-          </a:p>
-          <a:p>
-            <a:pPr marR="0" lvl="0" defTabSz="914400" eaLnBrk="1" fontAlgn="auto" latinLnBrk="0" hangingPunct="1">
-              <a:lnSpc>
-                <a:spcPct val="100000"/>
-              </a:lnSpc>
-              <a:spcBef>
-                <a:spcPts val="0"/>
-              </a:spcBef>
-              <a:spcAft>
-                <a:spcPts val="0"/>
-              </a:spcAft>
-              <a:buClrTx/>
-              <a:buSzTx/>
-              <a:buFont typeface="Wingdings" charset="2"/>
-              <a:buChar char="v"/>
-              <a:tabLst/>
-              <a:defRPr/>
-            </a:pPr>
-            <a:r>
-              <a:rPr lang="en-US" sz="1600" dirty="0" smtClean="0"/>
-              <a:t>.</a:t>
-            </a:r>
-          </a:p>
-          <a:p>
-            <a:pPr marL="0" marR="0" lvl="0" indent="0" defTabSz="914400" eaLnBrk="1" fontAlgn="auto" latinLnBrk="0" hangingPunct="1">
-              <a:lnSpc>
-                <a:spcPct val="100000"/>
-              </a:lnSpc>
-              <a:spcBef>
-                <a:spcPts val="0"/>
-              </a:spcBef>
-              <a:spcAft>
-                <a:spcPts val="0"/>
-              </a:spcAft>
-              <a:buClrTx/>
-              <a:buSzTx/>
-              <a:buNone/>
-              <a:tabLst/>
-              <a:defRPr/>
-            </a:pPr>
-            <a:endParaRPr lang="en-US" sz="1600" dirty="0" smtClean="0"/>
-          </a:p>
-          <a:p>
-            <a:pPr marR="0" lvl="0" defTabSz="914400" eaLnBrk="1" fontAlgn="auto" latinLnBrk="0" hangingPunct="1">
-              <a:lnSpc>
-                <a:spcPct val="100000"/>
-              </a:lnSpc>
-              <a:spcBef>
-                <a:spcPts val="0"/>
-              </a:spcBef>
-              <a:spcAft>
-                <a:spcPts val="0"/>
-              </a:spcAft>
-              <a:buClrTx/>
-              <a:buSzTx/>
-              <a:buFont typeface="Wingdings" charset="2"/>
-              <a:buChar char="v"/>
-              <a:tabLst/>
-              <a:defRPr/>
-            </a:pPr>
-            <a:r>
-              <a:rPr lang="en-US" sz="1600" dirty="0" smtClean="0"/>
-              <a:t>.</a:t>
-            </a:r>
-            <a:endParaRPr lang="en-US" sz="1600" dirty="0"/>
+            <a:r>
+              <a:rPr lang="en-US" dirty="0"/>
+              <a:t>Used One to Many relationships</a:t>
+            </a:r>
+            <a:endParaRPr lang="en-IE" dirty="0"/>
           </a:p>
         </p:txBody>
       </p:sp>
     </p:spTree>
     <p:extLst>
       <p:ext uri="{BB962C8B-B14F-4D97-AF65-F5344CB8AC3E}">
-        <p14:creationId xmlns:p14="http://schemas.microsoft.com/office/powerpoint/2010/main" val="1038625924"/>
+        <p14:creationId xmlns:p14="http://schemas.microsoft.com/office/powerpoint/2010/main" val="1410538677"/>
       </p:ext>
     </p:extLst>
   </p:cSld>

</xml_diff>